<commit_message>
update script and powerpoint
</commit_message>
<xml_diff>
--- a/Slides/Womeps_Day 1.pptx
+++ b/Slides/Womeps_Day 1.pptx
@@ -283,7 +283,7 @@
               <a:pPr>
                 <a:defRPr/>
               </a:pPr>
-              <a:t>06.04.2023</a:t>
+              <a:t>10.04.23</a:t>
             </a:fld>
             <a:endParaRPr lang="de-DE"/>
           </a:p>
@@ -588,9 +588,9 @@
         <a:solidFill>
           <a:srgbClr val="000000"/>
         </a:solidFill>
-        <a:latin typeface="Avenir Roman" charset="0"/>
-        <a:ea typeface="Avenir Roman" charset="0"/>
-        <a:cs typeface="Avenir Roman" charset="0"/>
+        <a:latin typeface="Avenir" charset="0"/>
+        <a:ea typeface="Avenir" charset="0"/>
+        <a:cs typeface="Avenir" charset="0"/>
         <a:sym typeface="Avenir Roman" charset="0"/>
       </a:defRPr>
     </a:lvl1pPr>
@@ -608,9 +608,9 @@
         <a:solidFill>
           <a:srgbClr val="000000"/>
         </a:solidFill>
-        <a:latin typeface="Avenir Roman" charset="0"/>
-        <a:ea typeface="Avenir Roman" charset="0"/>
-        <a:cs typeface="Avenir Roman" charset="0"/>
+        <a:latin typeface="Avenir" charset="0"/>
+        <a:ea typeface="Avenir" charset="0"/>
+        <a:cs typeface="Avenir" charset="0"/>
         <a:sym typeface="Avenir Roman" charset="0"/>
       </a:defRPr>
     </a:lvl2pPr>
@@ -628,9 +628,9 @@
         <a:solidFill>
           <a:srgbClr val="000000"/>
         </a:solidFill>
-        <a:latin typeface="Avenir Roman" charset="0"/>
-        <a:ea typeface="Avenir Roman" charset="0"/>
-        <a:cs typeface="Avenir Roman" charset="0"/>
+        <a:latin typeface="Avenir" charset="0"/>
+        <a:ea typeface="Avenir" charset="0"/>
+        <a:cs typeface="Avenir" charset="0"/>
         <a:sym typeface="Avenir Roman" charset="0"/>
       </a:defRPr>
     </a:lvl3pPr>
@@ -648,9 +648,9 @@
         <a:solidFill>
           <a:srgbClr val="000000"/>
         </a:solidFill>
-        <a:latin typeface="Avenir Roman" charset="0"/>
-        <a:ea typeface="Avenir Roman" charset="0"/>
-        <a:cs typeface="Avenir Roman" charset="0"/>
+        <a:latin typeface="Avenir" charset="0"/>
+        <a:ea typeface="Avenir" charset="0"/>
+        <a:cs typeface="Avenir" charset="0"/>
         <a:sym typeface="Avenir Roman" charset="0"/>
       </a:defRPr>
     </a:lvl4pPr>
@@ -668,9 +668,9 @@
         <a:solidFill>
           <a:srgbClr val="000000"/>
         </a:solidFill>
-        <a:latin typeface="Avenir Roman" charset="0"/>
-        <a:ea typeface="Avenir Roman" charset="0"/>
-        <a:cs typeface="Avenir Roman" charset="0"/>
+        <a:latin typeface="Avenir" charset="0"/>
+        <a:ea typeface="Avenir" charset="0"/>
+        <a:cs typeface="Avenir" charset="0"/>
         <a:sym typeface="Avenir Roman" charset="0"/>
       </a:defRPr>
     </a:lvl5pPr>
@@ -3551,7 +3551,7 @@
               <a:pPr eaLnBrk="1">
                 <a:defRPr/>
               </a:pPr>
-              <a:t>6. April 2023</a:t>
+              <a:t>10. April 2023</a:t>
             </a:fld>
             <a:endParaRPr lang="de-DE" altLang="de-DE" sz="1000" dirty="0">
               <a:solidFill>
@@ -4437,7 +4437,7 @@
               <a:pPr eaLnBrk="1">
                 <a:defRPr/>
               </a:pPr>
-              <a:t>6. April 2023</a:t>
+              <a:t>10. April 2023</a:t>
             </a:fld>
             <a:endParaRPr lang="de-DE" altLang="de-DE" sz="1000" dirty="0">
               <a:solidFill>
@@ -6008,12 +6008,12 @@
               <a:buChar char="•"/>
             </a:pPr>
             <a:r>
-              <a:rPr lang="de-DE" sz="2400" dirty="0" err="1"/>
-              <a:t>Ggplot</a:t>
+              <a:rPr lang="de-DE" sz="2400"/>
+              <a:t>ggplot2 </a:t>
             </a:r>
             <a:r>
               <a:rPr lang="de-DE" sz="2400" dirty="0"/>
-              <a:t> effektiv bei Abschlussarbeiten einsetzen</a:t>
+              <a:t>effektiv bei Abschlussarbeiten einsetzen</a:t>
             </a:r>
           </a:p>
           <a:p>
@@ -8635,90 +8635,6 @@
       </p:sp>
       <p:sp>
         <p:nvSpPr>
-          <p:cNvPr id="3" name="Inhaltsplatzhalter 2">
-            <a:extLst>
-              <a:ext uri="{FF2B5EF4-FFF2-40B4-BE49-F238E27FC236}">
-                <a16:creationId xmlns:a16="http://schemas.microsoft.com/office/drawing/2014/main" id="{21F71939-8E46-4A19-9C15-9EA58E87A06B}"/>
-              </a:ext>
-            </a:extLst>
-          </p:cNvPr>
-          <p:cNvSpPr>
-            <a:spLocks noGrp="1"/>
-          </p:cNvSpPr>
-          <p:nvPr>
-            <p:ph idx="1"/>
-          </p:nvPr>
-        </p:nvSpPr>
-        <p:spPr>
-          <a:xfrm>
-            <a:off x="467544" y="1484784"/>
-            <a:ext cx="3969003" cy="2232248"/>
-          </a:xfrm>
-          <a:ln w="19050">
-            <a:solidFill>
-              <a:schemeClr val="tx1"/>
-            </a:solidFill>
-          </a:ln>
-        </p:spPr>
-        <p:txBody>
-          <a:bodyPr>
-            <a:normAutofit/>
-          </a:bodyPr>
-          <a:lstStyle/>
-          <a:p>
-            <a:pPr marL="0" indent="0">
-              <a:lnSpc>
-                <a:spcPct val="110000"/>
-              </a:lnSpc>
-            </a:pPr>
-            <a:r>
-              <a:rPr lang="de-DE" sz="1600" b="1" u="sng" dirty="0"/>
-              <a:t>Wissenschaftlicher Mitarbeiter</a:t>
-            </a:r>
-          </a:p>
-          <a:p>
-            <a:pPr>
-              <a:lnSpc>
-                <a:spcPct val="110000"/>
-              </a:lnSpc>
-              <a:buFont typeface="Arial" panose="020B0604020202020204" pitchFamily="34" charset="0"/>
-              <a:buChar char="•"/>
-            </a:pPr>
-            <a:r>
-              <a:rPr lang="de-DE" sz="1600" dirty="0"/>
-              <a:t>Differentiellen Psychologie und Psychologische Diagnostik (GU)</a:t>
-            </a:r>
-          </a:p>
-          <a:p>
-            <a:pPr>
-              <a:lnSpc>
-                <a:spcPct val="110000"/>
-              </a:lnSpc>
-              <a:buFont typeface="Arial" panose="020B0604020202020204" pitchFamily="34" charset="0"/>
-              <a:buChar char="•"/>
-            </a:pPr>
-            <a:r>
-              <a:rPr lang="de-DE" sz="1600" dirty="0"/>
-              <a:t>Methodenzentrum der Sozialwissenschaften (GU)</a:t>
-            </a:r>
-          </a:p>
-          <a:p>
-            <a:pPr>
-              <a:lnSpc>
-                <a:spcPct val="110000"/>
-              </a:lnSpc>
-              <a:buFont typeface="Arial" panose="020B0604020202020204" pitchFamily="34" charset="0"/>
-              <a:buChar char="•"/>
-            </a:pPr>
-            <a:r>
-              <a:rPr lang="de-DE" sz="1600" dirty="0"/>
-              <a:t>Diagnostik in der Gesundheitsversorgung &amp; E-Health (Uni Trier)</a:t>
-            </a:r>
-          </a:p>
-        </p:txBody>
-      </p:sp>
-      <p:sp>
-        <p:nvSpPr>
           <p:cNvPr id="4" name="Foliennummernplatzhalter 3">
             <a:extLst>
               <a:ext uri="{FF2B5EF4-FFF2-40B4-BE49-F238E27FC236}">
@@ -8785,221 +8701,75 @@
       </p:sp>
       <p:sp>
         <p:nvSpPr>
-          <p:cNvPr id="6" name="Inhaltsplatzhalter 2">
+          <p:cNvPr id="9" name="Textfeld 8">
             <a:extLst>
               <a:ext uri="{FF2B5EF4-FFF2-40B4-BE49-F238E27FC236}">
-                <a16:creationId xmlns:a16="http://schemas.microsoft.com/office/drawing/2014/main" id="{A549F2E9-AA33-4ED5-AB7D-4967F5A01B52}"/>
+                <a16:creationId xmlns:a16="http://schemas.microsoft.com/office/drawing/2014/main" id="{5F90E4B0-8FBD-2556-1CF4-B75C145EBDE7}"/>
               </a:ext>
             </a:extLst>
           </p:cNvPr>
-          <p:cNvSpPr txBox="1">
-            <a:spLocks/>
-          </p:cNvSpPr>
+          <p:cNvSpPr txBox="1"/>
           <p:nvPr/>
         </p:nvSpPr>
         <p:spPr>
           <a:xfrm>
-            <a:off x="4707453" y="1484784"/>
-            <a:ext cx="3969003" cy="2232248"/>
+            <a:off x="473521" y="1484784"/>
+            <a:ext cx="8166479" cy="5112425"/>
           </a:xfrm>
           <a:prstGeom prst="rect">
             <a:avLst/>
           </a:prstGeom>
-          <a:ln w="19050">
-            <a:solidFill>
-              <a:schemeClr val="tx1"/>
-            </a:solidFill>
-          </a:ln>
+          <a:noFill/>
         </p:spPr>
         <p:txBody>
-          <a:bodyPr>
-            <a:normAutofit lnSpcReduction="10000"/>
+          <a:bodyPr wrap="square" rtlCol="0">
+            <a:spAutoFit/>
           </a:bodyPr>
-          <a:lstStyle>
-            <a:lvl1pPr marL="342900" indent="-342900" algn="l" rtl="0" eaLnBrk="0" fontAlgn="base" hangingPunct="0">
-              <a:spcBef>
-                <a:spcPts val="300"/>
-              </a:spcBef>
-              <a:spcAft>
-                <a:spcPct val="0"/>
-              </a:spcAft>
-              <a:defRPr sz="1800" kern="1200">
-                <a:solidFill>
-                  <a:srgbClr val="000000"/>
-                </a:solidFill>
-                <a:latin typeface="Arial Narrow" panose="020B0606020202030204" pitchFamily="34" charset="0"/>
-                <a:ea typeface="+mn-ea"/>
-                <a:cs typeface="+mn-cs"/>
-                <a:sym typeface="Arial" panose="020B0604020202020204" pitchFamily="34" charset="0"/>
-              </a:defRPr>
-            </a:lvl1pPr>
-            <a:lvl2pPr marL="417513" indent="-236538" algn="l" rtl="0" eaLnBrk="0" fontAlgn="base" hangingPunct="0">
-              <a:spcBef>
-                <a:spcPts val="300"/>
-              </a:spcBef>
-              <a:spcAft>
-                <a:spcPct val="0"/>
-              </a:spcAft>
-              <a:buClrTx/>
-              <a:buSzPct val="100000"/>
-              <a:buFont typeface="Arial" panose="020B0604020202020204" pitchFamily="34" charset="0"/>
-              <a:buChar char="•"/>
-              <a:defRPr sz="1800" kern="1200">
-                <a:solidFill>
-                  <a:srgbClr val="000000"/>
-                </a:solidFill>
-                <a:latin typeface="Arial Narrow" panose="020B0606020202030204" pitchFamily="34" charset="0"/>
-                <a:ea typeface="+mn-ea"/>
-                <a:cs typeface="+mn-cs"/>
-                <a:sym typeface="Arial" panose="020B0604020202020204" pitchFamily="34" charset="0"/>
-              </a:defRPr>
-            </a:lvl2pPr>
-            <a:lvl3pPr marL="687388" indent="-241300" algn="l" rtl="0" eaLnBrk="0" fontAlgn="base" hangingPunct="0">
-              <a:spcBef>
-                <a:spcPts val="300"/>
-              </a:spcBef>
-              <a:spcAft>
-                <a:spcPct val="0"/>
-              </a:spcAft>
-              <a:buSzPct val="100000"/>
-              <a:buFont typeface="Arial" panose="020B0604020202020204" pitchFamily="34" charset="0"/>
-              <a:buChar char="•"/>
-              <a:defRPr sz="1800" kern="1200">
-                <a:solidFill>
-                  <a:srgbClr val="000000"/>
-                </a:solidFill>
-                <a:latin typeface="Arial Narrow" panose="020B0606020202030204" pitchFamily="34" charset="0"/>
-                <a:ea typeface="+mn-ea"/>
-                <a:cs typeface="+mn-cs"/>
-                <a:sym typeface="Arial" panose="020B0604020202020204" pitchFamily="34" charset="0"/>
-              </a:defRPr>
-            </a:lvl3pPr>
-            <a:lvl4pPr marL="955675" indent="-241300" algn="l" rtl="0" eaLnBrk="0" fontAlgn="base" hangingPunct="0">
-              <a:spcBef>
-                <a:spcPts val="300"/>
-              </a:spcBef>
-              <a:spcAft>
-                <a:spcPct val="0"/>
-              </a:spcAft>
-              <a:buSzPct val="100000"/>
-              <a:buFont typeface="Arial" panose="020B0604020202020204" pitchFamily="34" charset="0"/>
-              <a:buChar char="•"/>
-              <a:defRPr sz="1800" kern="1200">
-                <a:solidFill>
-                  <a:srgbClr val="000000"/>
-                </a:solidFill>
-                <a:latin typeface="Arial Narrow" panose="020B0606020202030204" pitchFamily="34" charset="0"/>
-                <a:ea typeface="+mn-ea"/>
-                <a:cs typeface="+mn-cs"/>
-                <a:sym typeface="Arial" panose="020B0604020202020204" pitchFamily="34" charset="0"/>
-              </a:defRPr>
-            </a:lvl4pPr>
-            <a:lvl5pPr marL="1227138" indent="-238125" algn="l" rtl="0" eaLnBrk="0" fontAlgn="base" hangingPunct="0">
-              <a:spcBef>
-                <a:spcPts val="300"/>
-              </a:spcBef>
-              <a:spcAft>
-                <a:spcPct val="0"/>
-              </a:spcAft>
-              <a:buSzPct val="100000"/>
-              <a:buFont typeface="Arial" panose="020B0604020202020204" pitchFamily="34" charset="0"/>
-              <a:buChar char="•"/>
-              <a:defRPr sz="1800" kern="1200">
-                <a:solidFill>
-                  <a:srgbClr val="000000"/>
-                </a:solidFill>
-                <a:latin typeface="Arial Narrow" panose="020B0606020202030204" pitchFamily="34" charset="0"/>
-                <a:ea typeface="+mn-ea"/>
-                <a:cs typeface="+mn-cs"/>
-                <a:sym typeface="Arial" panose="020B0604020202020204" pitchFamily="34" charset="0"/>
-              </a:defRPr>
-            </a:lvl5pPr>
-            <a:lvl6pPr marL="2514600" indent="-228600" algn="l" defTabSz="914400" rtl="0" eaLnBrk="1" latinLnBrk="0" hangingPunct="1">
-              <a:lnSpc>
-                <a:spcPct val="90000"/>
-              </a:lnSpc>
-              <a:spcBef>
-                <a:spcPts val="500"/>
-              </a:spcBef>
-              <a:buFont typeface="Arial" panose="020B0604020202020204" pitchFamily="34" charset="0"/>
-              <a:buChar char="•"/>
-              <a:defRPr sz="1800" kern="1200">
-                <a:solidFill>
-                  <a:schemeClr val="tx1"/>
-                </a:solidFill>
-                <a:latin typeface="+mn-lt"/>
-                <a:ea typeface="+mn-ea"/>
-                <a:cs typeface="+mn-cs"/>
-              </a:defRPr>
-            </a:lvl6pPr>
-            <a:lvl7pPr marL="2971800" indent="-228600" algn="l" defTabSz="914400" rtl="0" eaLnBrk="1" latinLnBrk="0" hangingPunct="1">
-              <a:lnSpc>
-                <a:spcPct val="90000"/>
-              </a:lnSpc>
-              <a:spcBef>
-                <a:spcPts val="500"/>
-              </a:spcBef>
-              <a:buFont typeface="Arial" panose="020B0604020202020204" pitchFamily="34" charset="0"/>
-              <a:buChar char="•"/>
-              <a:defRPr sz="1800" kern="1200">
-                <a:solidFill>
-                  <a:schemeClr val="tx1"/>
-                </a:solidFill>
-                <a:latin typeface="+mn-lt"/>
-                <a:ea typeface="+mn-ea"/>
-                <a:cs typeface="+mn-cs"/>
-              </a:defRPr>
-            </a:lvl7pPr>
-            <a:lvl8pPr marL="3429000" indent="-228600" algn="l" defTabSz="914400" rtl="0" eaLnBrk="1" latinLnBrk="0" hangingPunct="1">
-              <a:lnSpc>
-                <a:spcPct val="90000"/>
-              </a:lnSpc>
-              <a:spcBef>
-                <a:spcPts val="500"/>
-              </a:spcBef>
-              <a:buFont typeface="Arial" panose="020B0604020202020204" pitchFamily="34" charset="0"/>
-              <a:buChar char="•"/>
-              <a:defRPr sz="1800" kern="1200">
-                <a:solidFill>
-                  <a:schemeClr val="tx1"/>
-                </a:solidFill>
-                <a:latin typeface="+mn-lt"/>
-                <a:ea typeface="+mn-ea"/>
-                <a:cs typeface="+mn-cs"/>
-              </a:defRPr>
-            </a:lvl8pPr>
-            <a:lvl9pPr marL="3886200" indent="-228600" algn="l" defTabSz="914400" rtl="0" eaLnBrk="1" latinLnBrk="0" hangingPunct="1">
-              <a:lnSpc>
-                <a:spcPct val="90000"/>
-              </a:lnSpc>
-              <a:spcBef>
-                <a:spcPts val="500"/>
-              </a:spcBef>
-              <a:buFont typeface="Arial" panose="020B0604020202020204" pitchFamily="34" charset="0"/>
-              <a:buChar char="•"/>
-              <a:defRPr sz="1800" kern="1200">
-                <a:solidFill>
-                  <a:schemeClr val="tx1"/>
-                </a:solidFill>
-                <a:latin typeface="+mn-lt"/>
-                <a:ea typeface="+mn-ea"/>
-                <a:cs typeface="+mn-cs"/>
-              </a:defRPr>
-            </a:lvl9pPr>
-          </a:lstStyle>
-          <a:p>
-            <a:pPr marL="0" indent="0">
+          <a:lstStyle/>
+          <a:p>
+            <a:pPr marL="285750" indent="-285750">
               <a:lnSpc>
                 <a:spcPct val="150000"/>
               </a:lnSpc>
-            </a:pPr>
-            <a:r>
-              <a:rPr lang="de-DE" sz="1600" b="1" u="sng" dirty="0"/>
-              <a:t>Forschungsinteressen</a:t>
-            </a:r>
-          </a:p>
-          <a:p>
-            <a:pPr>
+              <a:buFont typeface="Arial" panose="020B0604020202020204" pitchFamily="34" charset="0"/>
+              <a:buChar char="•"/>
+            </a:pPr>
+            <a:r>
+              <a:rPr lang="de-DE" sz="2000" b="1" dirty="0">
+                <a:solidFill>
+                  <a:srgbClr val="000000"/>
+                </a:solidFill>
+                <a:latin typeface="+mn-lt"/>
+              </a:rPr>
+              <a:t>Studentischer</a:t>
+            </a:r>
+            <a:r>
+              <a:rPr lang="de-DE" sz="1800" b="1" dirty="0">
+                <a:solidFill>
+                  <a:srgbClr val="000000"/>
+                </a:solidFill>
+                <a:latin typeface="+mn-lt"/>
+              </a:rPr>
+              <a:t> </a:t>
+            </a:r>
+            <a:r>
+              <a:rPr lang="de-DE" sz="2000" b="1" dirty="0">
+                <a:solidFill>
+                  <a:srgbClr val="000000"/>
+                </a:solidFill>
+                <a:latin typeface="+mn-lt"/>
+              </a:rPr>
+              <a:t>Mitarbeiter</a:t>
+            </a:r>
+            <a:endParaRPr lang="de-DE" sz="1800" b="1" dirty="0">
+              <a:solidFill>
+                <a:srgbClr val="000000"/>
+              </a:solidFill>
+              <a:latin typeface="+mn-lt"/>
+            </a:endParaRPr>
+          </a:p>
+          <a:p>
+            <a:pPr marL="742950" lvl="1" indent="-285750">
               <a:lnSpc>
                 <a:spcPct val="150000"/>
               </a:lnSpc>
@@ -9007,12 +8777,17 @@
               <a:buChar char="•"/>
             </a:pPr>
             <a:r>
-              <a:rPr lang="de-DE" sz="1600" dirty="0"/>
-              <a:t>Umweltpsychologie</a:t>
-            </a:r>
-          </a:p>
-          <a:p>
-            <a:pPr>
+              <a:rPr lang="de-DE" sz="2000" dirty="0">
+                <a:solidFill>
+                  <a:srgbClr val="000000"/>
+                </a:solidFill>
+                <a:latin typeface="+mn-lt"/>
+              </a:rPr>
+              <a:t>Methodenzentrum der Sozialwissenschaften</a:t>
+            </a:r>
+          </a:p>
+          <a:p>
+            <a:pPr marL="742950" lvl="1" indent="-285750">
               <a:lnSpc>
                 <a:spcPct val="150000"/>
               </a:lnSpc>
@@ -9020,29 +8795,41 @@
               <a:buChar char="•"/>
             </a:pPr>
             <a:r>
-              <a:rPr lang="de-DE" sz="1600" dirty="0" err="1"/>
-              <a:t>Spatial</a:t>
-            </a:r>
-            <a:r>
-              <a:rPr lang="de-DE" sz="1600" dirty="0"/>
-              <a:t> Analysis</a:t>
-            </a:r>
-          </a:p>
-          <a:p>
-            <a:pPr>
-              <a:lnSpc>
-                <a:spcPct val="110000"/>
-              </a:lnSpc>
-              <a:buFont typeface="Arial" panose="020B0604020202020204" pitchFamily="34" charset="0"/>
-              <a:buChar char="•"/>
-            </a:pPr>
-            <a:r>
-              <a:rPr lang="de-DE" sz="1600" dirty="0"/>
-              <a:t>Epidemiologie psychischer Erkrankungen</a:t>
-            </a:r>
-          </a:p>
-          <a:p>
-            <a:pPr>
+              <a:rPr lang="de-DE" sz="2000" dirty="0">
+                <a:solidFill>
+                  <a:srgbClr val="000000"/>
+                </a:solidFill>
+                <a:latin typeface="+mn-lt"/>
+              </a:rPr>
+              <a:t>Institut für psychologische Methoden mit interdiszplinärer Ausrichtung (Projekt </a:t>
+            </a:r>
+            <a:r>
+              <a:rPr lang="de-DE" sz="2000" dirty="0" err="1">
+                <a:solidFill>
+                  <a:srgbClr val="000000"/>
+                </a:solidFill>
+                <a:latin typeface="+mn-lt"/>
+              </a:rPr>
+              <a:t>tigeR</a:t>
+            </a:r>
+            <a:r>
+              <a:rPr lang="de-DE" sz="2000" dirty="0">
+                <a:solidFill>
+                  <a:srgbClr val="000000"/>
+                </a:solidFill>
+                <a:latin typeface="+mn-lt"/>
+              </a:rPr>
+              <a:t>)</a:t>
+            </a:r>
+            <a:endParaRPr lang="de-DE" sz="2000" b="1" dirty="0">
+              <a:solidFill>
+                <a:srgbClr val="000000"/>
+              </a:solidFill>
+              <a:latin typeface="+mn-lt"/>
+            </a:endParaRPr>
+          </a:p>
+          <a:p>
+            <a:pPr marL="285750" indent="-285750">
               <a:lnSpc>
                 <a:spcPct val="150000"/>
               </a:lnSpc>
@@ -9050,12 +8837,17 @@
               <a:buChar char="•"/>
             </a:pPr>
             <a:r>
-              <a:rPr lang="de-DE" sz="1600" dirty="0"/>
-              <a:t>Migration und Akkulturation</a:t>
-            </a:r>
-          </a:p>
-          <a:p>
-            <a:pPr>
+              <a:rPr lang="de-DE" sz="2000" b="1" dirty="0">
+                <a:solidFill>
+                  <a:srgbClr val="000000"/>
+                </a:solidFill>
+                <a:latin typeface="+mn-lt"/>
+              </a:rPr>
+              <a:t>Forschungsinteressen</a:t>
+            </a:r>
+          </a:p>
+          <a:p>
+            <a:pPr marL="742950" lvl="1" indent="-285750">
               <a:lnSpc>
                 <a:spcPct val="150000"/>
               </a:lnSpc>
@@ -9063,508 +8855,144 @@
               <a:buChar char="•"/>
             </a:pPr>
             <a:r>
-              <a:rPr lang="de-DE" sz="1600" dirty="0"/>
-              <a:t>Testkonstruktion</a:t>
-            </a:r>
-          </a:p>
-        </p:txBody>
-      </p:sp>
-      <p:sp>
-        <p:nvSpPr>
-          <p:cNvPr id="7" name="Inhaltsplatzhalter 2">
-            <a:extLst>
-              <a:ext uri="{FF2B5EF4-FFF2-40B4-BE49-F238E27FC236}">
-                <a16:creationId xmlns:a16="http://schemas.microsoft.com/office/drawing/2014/main" id="{B424BE03-E897-4711-B1F7-352C117318E4}"/>
-              </a:ext>
-            </a:extLst>
-          </p:cNvPr>
-          <p:cNvSpPr txBox="1">
-            <a:spLocks/>
-          </p:cNvSpPr>
-          <p:nvPr/>
-        </p:nvSpPr>
-        <p:spPr>
-          <a:xfrm>
-            <a:off x="467544" y="3861048"/>
-            <a:ext cx="3969003" cy="2232248"/>
-          </a:xfrm>
-          <a:prstGeom prst="rect">
-            <a:avLst/>
-          </a:prstGeom>
-          <a:ln w="19050">
-            <a:solidFill>
-              <a:schemeClr val="tx1"/>
-            </a:solidFill>
-          </a:ln>
-        </p:spPr>
-        <p:txBody>
-          <a:bodyPr>
-            <a:normAutofit/>
-          </a:bodyPr>
-          <a:lstStyle>
-            <a:lvl1pPr marL="342900" indent="-342900" algn="l" rtl="0" eaLnBrk="0" fontAlgn="base" hangingPunct="0">
-              <a:spcBef>
-                <a:spcPts val="300"/>
-              </a:spcBef>
-              <a:spcAft>
-                <a:spcPct val="0"/>
-              </a:spcAft>
-              <a:defRPr sz="1800" kern="1200">
+              <a:rPr lang="de-DE" sz="2000" dirty="0">
                 <a:solidFill>
                   <a:srgbClr val="000000"/>
                 </a:solidFill>
-                <a:latin typeface="Arial Narrow" panose="020B0606020202030204" pitchFamily="34" charset="0"/>
-                <a:ea typeface="+mn-ea"/>
-                <a:cs typeface="+mn-cs"/>
-                <a:sym typeface="Arial" panose="020B0604020202020204" pitchFamily="34" charset="0"/>
-              </a:defRPr>
-            </a:lvl1pPr>
-            <a:lvl2pPr marL="417513" indent="-236538" algn="l" rtl="0" eaLnBrk="0" fontAlgn="base" hangingPunct="0">
-              <a:spcBef>
-                <a:spcPts val="300"/>
-              </a:spcBef>
-              <a:spcAft>
-                <a:spcPct val="0"/>
-              </a:spcAft>
-              <a:buClrTx/>
-              <a:buSzPct val="100000"/>
-              <a:buFont typeface="Arial" panose="020B0604020202020204" pitchFamily="34" charset="0"/>
-              <a:buChar char="•"/>
-              <a:defRPr sz="1800" kern="1200">
+                <a:latin typeface="+mn-lt"/>
+              </a:rPr>
+              <a:t>Transdiagnostische Psychopathologie</a:t>
+            </a:r>
+          </a:p>
+          <a:p>
+            <a:pPr marL="742950" lvl="1" indent="-285750">
+              <a:lnSpc>
+                <a:spcPct val="150000"/>
+              </a:lnSpc>
+              <a:buFont typeface="Arial" panose="020B0604020202020204" pitchFamily="34" charset="0"/>
+              <a:buChar char="•"/>
+            </a:pPr>
+            <a:r>
+              <a:rPr lang="de-DE" sz="2000" dirty="0">
                 <a:solidFill>
                   <a:srgbClr val="000000"/>
                 </a:solidFill>
-                <a:latin typeface="Arial Narrow" panose="020B0606020202030204" pitchFamily="34" charset="0"/>
-                <a:ea typeface="+mn-ea"/>
-                <a:cs typeface="+mn-cs"/>
-                <a:sym typeface="Arial" panose="020B0604020202020204" pitchFamily="34" charset="0"/>
-              </a:defRPr>
-            </a:lvl2pPr>
-            <a:lvl3pPr marL="687388" indent="-241300" algn="l" rtl="0" eaLnBrk="0" fontAlgn="base" hangingPunct="0">
-              <a:spcBef>
-                <a:spcPts val="300"/>
-              </a:spcBef>
-              <a:spcAft>
-                <a:spcPct val="0"/>
-              </a:spcAft>
-              <a:buSzPct val="100000"/>
-              <a:buFont typeface="Arial" panose="020B0604020202020204" pitchFamily="34" charset="0"/>
-              <a:buChar char="•"/>
-              <a:defRPr sz="1800" kern="1200">
+                <a:latin typeface="+mn-lt"/>
+              </a:rPr>
+              <a:t>Open Science</a:t>
+            </a:r>
+          </a:p>
+          <a:p>
+            <a:pPr marL="742950" lvl="1" indent="-285750">
+              <a:lnSpc>
+                <a:spcPct val="150000"/>
+              </a:lnSpc>
+              <a:buFont typeface="Arial" panose="020B0604020202020204" pitchFamily="34" charset="0"/>
+              <a:buChar char="•"/>
+            </a:pPr>
+            <a:r>
+              <a:rPr lang="de-DE" sz="2000" dirty="0">
                 <a:solidFill>
                   <a:srgbClr val="000000"/>
                 </a:solidFill>
-                <a:latin typeface="Arial Narrow" panose="020B0606020202030204" pitchFamily="34" charset="0"/>
-                <a:ea typeface="+mn-ea"/>
-                <a:cs typeface="+mn-cs"/>
-                <a:sym typeface="Arial" panose="020B0604020202020204" pitchFamily="34" charset="0"/>
-              </a:defRPr>
-            </a:lvl3pPr>
-            <a:lvl4pPr marL="955675" indent="-241300" algn="l" rtl="0" eaLnBrk="0" fontAlgn="base" hangingPunct="0">
-              <a:spcBef>
-                <a:spcPts val="300"/>
-              </a:spcBef>
-              <a:spcAft>
-                <a:spcPct val="0"/>
-              </a:spcAft>
-              <a:buSzPct val="100000"/>
-              <a:buFont typeface="Arial" panose="020B0604020202020204" pitchFamily="34" charset="0"/>
-              <a:buChar char="•"/>
-              <a:defRPr sz="1800" kern="1200">
+                <a:latin typeface="+mn-lt"/>
+              </a:rPr>
+              <a:t>So ziemlich alles mit Methoden</a:t>
+            </a:r>
+          </a:p>
+          <a:p>
+            <a:pPr marL="285750" indent="-285750">
+              <a:lnSpc>
+                <a:spcPct val="150000"/>
+              </a:lnSpc>
+              <a:buFont typeface="Arial" panose="020B0604020202020204" pitchFamily="34" charset="0"/>
+              <a:buChar char="•"/>
+            </a:pPr>
+            <a:r>
+              <a:rPr lang="de-DE" sz="2000" b="1" dirty="0">
                 <a:solidFill>
                   <a:srgbClr val="000000"/>
                 </a:solidFill>
-                <a:latin typeface="Arial Narrow" panose="020B0606020202030204" pitchFamily="34" charset="0"/>
-                <a:ea typeface="+mn-ea"/>
-                <a:cs typeface="+mn-cs"/>
-                <a:sym typeface="Arial" panose="020B0604020202020204" pitchFamily="34" charset="0"/>
-              </a:defRPr>
-            </a:lvl4pPr>
-            <a:lvl5pPr marL="1227138" indent="-238125" algn="l" rtl="0" eaLnBrk="0" fontAlgn="base" hangingPunct="0">
-              <a:spcBef>
-                <a:spcPts val="300"/>
-              </a:spcBef>
-              <a:spcAft>
-                <a:spcPct val="0"/>
-              </a:spcAft>
-              <a:buSzPct val="100000"/>
-              <a:buFont typeface="Arial" panose="020B0604020202020204" pitchFamily="34" charset="0"/>
-              <a:buChar char="•"/>
-              <a:defRPr sz="1800" kern="1200">
+                <a:latin typeface="+mn-lt"/>
+              </a:rPr>
+              <a:t>Lehre</a:t>
+            </a:r>
+            <a:endParaRPr lang="de-DE" sz="1800" b="1" dirty="0">
+              <a:solidFill>
+                <a:srgbClr val="000000"/>
+              </a:solidFill>
+              <a:latin typeface="+mn-lt"/>
+            </a:endParaRPr>
+          </a:p>
+          <a:p>
+            <a:pPr marL="742950" lvl="1" indent="-285750">
+              <a:lnSpc>
+                <a:spcPct val="150000"/>
+              </a:lnSpc>
+              <a:buFont typeface="Arial" panose="020B0604020202020204" pitchFamily="34" charset="0"/>
+              <a:buChar char="•"/>
+            </a:pPr>
+            <a:r>
+              <a:rPr lang="de-DE" sz="2000" dirty="0">
                 <a:solidFill>
                   <a:srgbClr val="000000"/>
                 </a:solidFill>
-                <a:latin typeface="Arial Narrow" panose="020B0606020202030204" pitchFamily="34" charset="0"/>
-                <a:ea typeface="+mn-ea"/>
-                <a:cs typeface="+mn-cs"/>
-                <a:sym typeface="Arial" panose="020B0604020202020204" pitchFamily="34" charset="0"/>
-              </a:defRPr>
-            </a:lvl5pPr>
-            <a:lvl6pPr marL="2514600" indent="-228600" algn="l" defTabSz="914400" rtl="0" eaLnBrk="1" latinLnBrk="0" hangingPunct="1">
+                <a:latin typeface="+mn-lt"/>
+              </a:rPr>
+              <a:t>Vertiefungsseminar zu Testtheorie und Testkonstruktion (</a:t>
+            </a:r>
+            <a:r>
+              <a:rPr lang="de-DE" sz="2000" dirty="0" err="1">
+                <a:solidFill>
+                  <a:srgbClr val="000000"/>
+                </a:solidFill>
+                <a:latin typeface="+mn-lt"/>
+              </a:rPr>
+              <a:t>BSc</a:t>
+            </a:r>
+            <a:r>
+              <a:rPr lang="de-DE" sz="2000" dirty="0">
+                <a:solidFill>
+                  <a:srgbClr val="000000"/>
+                </a:solidFill>
+                <a:latin typeface="+mn-lt"/>
+              </a:rPr>
+              <a:t>-Psychologie)</a:t>
+            </a:r>
+          </a:p>
+          <a:p>
+            <a:pPr marL="742950" lvl="1" indent="-285750">
               <a:lnSpc>
-                <a:spcPct val="90000"/>
+                <a:spcPct val="150000"/>
               </a:lnSpc>
-              <a:spcBef>
-                <a:spcPts val="500"/>
-              </a:spcBef>
-              <a:buFont typeface="Arial" panose="020B0604020202020204" pitchFamily="34" charset="0"/>
-              <a:buChar char="•"/>
-              <a:defRPr sz="1800" kern="1200">
-                <a:solidFill>
-                  <a:schemeClr val="tx1"/>
+              <a:buFont typeface="Arial" panose="020B0604020202020204" pitchFamily="34" charset="0"/>
+              <a:buChar char="•"/>
+            </a:pPr>
+            <a:r>
+              <a:rPr lang="de-DE" sz="2000" dirty="0">
+                <a:solidFill>
+                  <a:srgbClr val="000000"/>
                 </a:solidFill>
                 <a:latin typeface="+mn-lt"/>
-                <a:ea typeface="+mn-ea"/>
-                <a:cs typeface="+mn-cs"/>
-              </a:defRPr>
-            </a:lvl6pPr>
-            <a:lvl7pPr marL="2971800" indent="-228600" algn="l" defTabSz="914400" rtl="0" eaLnBrk="1" latinLnBrk="0" hangingPunct="1">
-              <a:lnSpc>
-                <a:spcPct val="90000"/>
-              </a:lnSpc>
-              <a:spcBef>
-                <a:spcPts val="500"/>
-              </a:spcBef>
-              <a:buFont typeface="Arial" panose="020B0604020202020204" pitchFamily="34" charset="0"/>
-              <a:buChar char="•"/>
-              <a:defRPr sz="1800" kern="1200">
-                <a:solidFill>
-                  <a:schemeClr val="tx1"/>
+              </a:rPr>
+              <a:t>Jetzt das erste mal einen Workshop </a:t>
+            </a:r>
+            <a:r>
+              <a:rPr lang="de-DE" sz="2000" dirty="0">
+                <a:solidFill>
+                  <a:srgbClr val="000000"/>
                 </a:solidFill>
                 <a:latin typeface="+mn-lt"/>
-                <a:ea typeface="+mn-ea"/>
-                <a:cs typeface="+mn-cs"/>
-              </a:defRPr>
-            </a:lvl7pPr>
-            <a:lvl8pPr marL="3429000" indent="-228600" algn="l" defTabSz="914400" rtl="0" eaLnBrk="1" latinLnBrk="0" hangingPunct="1">
-              <a:lnSpc>
-                <a:spcPct val="90000"/>
-              </a:lnSpc>
-              <a:spcBef>
-                <a:spcPts val="500"/>
-              </a:spcBef>
-              <a:buFont typeface="Arial" panose="020B0604020202020204" pitchFamily="34" charset="0"/>
-              <a:buChar char="•"/>
-              <a:defRPr sz="1800" kern="1200">
-                <a:solidFill>
-                  <a:schemeClr val="tx1"/>
-                </a:solidFill>
-                <a:latin typeface="+mn-lt"/>
-                <a:ea typeface="+mn-ea"/>
-                <a:cs typeface="+mn-cs"/>
-              </a:defRPr>
-            </a:lvl8pPr>
-            <a:lvl9pPr marL="3886200" indent="-228600" algn="l" defTabSz="914400" rtl="0" eaLnBrk="1" latinLnBrk="0" hangingPunct="1">
-              <a:lnSpc>
-                <a:spcPct val="90000"/>
-              </a:lnSpc>
-              <a:spcBef>
-                <a:spcPts val="500"/>
-              </a:spcBef>
-              <a:buFont typeface="Arial" panose="020B0604020202020204" pitchFamily="34" charset="0"/>
-              <a:buChar char="•"/>
-              <a:defRPr sz="1800" kern="1200">
-                <a:solidFill>
-                  <a:schemeClr val="tx1"/>
-                </a:solidFill>
-                <a:latin typeface="+mn-lt"/>
-                <a:ea typeface="+mn-ea"/>
-                <a:cs typeface="+mn-cs"/>
-              </a:defRPr>
-            </a:lvl9pPr>
-          </a:lstStyle>
-          <a:p>
-            <a:pPr marL="0" indent="0"/>
-            <a:r>
-              <a:rPr lang="de-DE" sz="1600" b="1" u="sng" dirty="0"/>
-              <a:t>Aktuelle Forschungsprojekte</a:t>
-            </a:r>
-          </a:p>
-          <a:p>
-            <a:pPr>
-              <a:buFont typeface="Arial" panose="020B0604020202020204" pitchFamily="34" charset="0"/>
-              <a:buChar char="•"/>
-            </a:pPr>
-            <a:r>
-              <a:rPr lang="de-DE" sz="1600" dirty="0" err="1"/>
-              <a:t>Spatial</a:t>
-            </a:r>
-            <a:r>
-              <a:rPr lang="de-DE" sz="1600" dirty="0"/>
-              <a:t> Analysis </a:t>
-            </a:r>
-            <a:r>
-              <a:rPr lang="de-DE" sz="1600" dirty="0" err="1"/>
-              <a:t>of</a:t>
-            </a:r>
-            <a:r>
-              <a:rPr lang="de-DE" sz="1600" dirty="0"/>
-              <a:t> Environmental Mental Health</a:t>
-            </a:r>
-          </a:p>
-          <a:p>
-            <a:pPr>
-              <a:buFont typeface="Arial" panose="020B0604020202020204" pitchFamily="34" charset="0"/>
-              <a:buChar char="•"/>
-            </a:pPr>
-            <a:r>
-              <a:rPr lang="de-DE" sz="1600" dirty="0"/>
-              <a:t>Dynamics </a:t>
-            </a:r>
-            <a:r>
-              <a:rPr lang="de-DE" sz="1600" dirty="0" err="1"/>
-              <a:t>of</a:t>
-            </a:r>
-            <a:r>
-              <a:rPr lang="de-DE" sz="1600" dirty="0"/>
-              <a:t> Mental Health </a:t>
-            </a:r>
-            <a:r>
-              <a:rPr lang="de-DE" sz="1600" dirty="0" err="1"/>
-              <a:t>of</a:t>
-            </a:r>
-            <a:r>
-              <a:rPr lang="de-DE" sz="1600" dirty="0"/>
-              <a:t> </a:t>
-            </a:r>
-            <a:r>
-              <a:rPr lang="de-DE" sz="1600" dirty="0" err="1"/>
-              <a:t>Migrants</a:t>
-            </a:r>
-            <a:endParaRPr lang="de-DE" sz="1600" dirty="0"/>
-          </a:p>
-        </p:txBody>
-      </p:sp>
-      <p:sp>
-        <p:nvSpPr>
-          <p:cNvPr id="8" name="Inhaltsplatzhalter 2">
-            <a:extLst>
-              <a:ext uri="{FF2B5EF4-FFF2-40B4-BE49-F238E27FC236}">
-                <a16:creationId xmlns:a16="http://schemas.microsoft.com/office/drawing/2014/main" id="{075BA86D-B185-40A7-983C-66E644AEBDCA}"/>
-              </a:ext>
-            </a:extLst>
-          </p:cNvPr>
-          <p:cNvSpPr txBox="1">
-            <a:spLocks/>
-          </p:cNvSpPr>
-          <p:nvPr/>
-        </p:nvSpPr>
-        <p:spPr>
-          <a:xfrm>
-            <a:off x="4701476" y="3861048"/>
-            <a:ext cx="3969003" cy="2232248"/>
-          </a:xfrm>
-          <a:prstGeom prst="rect">
-            <a:avLst/>
-          </a:prstGeom>
-          <a:ln w="19050">
-            <a:solidFill>
-              <a:schemeClr val="tx1"/>
-            </a:solidFill>
-          </a:ln>
-        </p:spPr>
-        <p:txBody>
-          <a:bodyPr>
-            <a:normAutofit/>
-          </a:bodyPr>
-          <a:lstStyle>
-            <a:lvl1pPr marL="342900" indent="-342900" algn="l" rtl="0" eaLnBrk="0" fontAlgn="base" hangingPunct="0">
-              <a:spcBef>
-                <a:spcPts val="300"/>
-              </a:spcBef>
-              <a:spcAft>
-                <a:spcPct val="0"/>
-              </a:spcAft>
-              <a:defRPr sz="1800" kern="1200">
-                <a:solidFill>
-                  <a:srgbClr val="000000"/>
-                </a:solidFill>
-                <a:latin typeface="Arial Narrow" panose="020B0606020202030204" pitchFamily="34" charset="0"/>
-                <a:ea typeface="+mn-ea"/>
-                <a:cs typeface="+mn-cs"/>
-                <a:sym typeface="Arial" panose="020B0604020202020204" pitchFamily="34" charset="0"/>
-              </a:defRPr>
-            </a:lvl1pPr>
-            <a:lvl2pPr marL="417513" indent="-236538" algn="l" rtl="0" eaLnBrk="0" fontAlgn="base" hangingPunct="0">
-              <a:spcBef>
-                <a:spcPts val="300"/>
-              </a:spcBef>
-              <a:spcAft>
-                <a:spcPct val="0"/>
-              </a:spcAft>
-              <a:buClrTx/>
-              <a:buSzPct val="100000"/>
-              <a:buFont typeface="Arial" panose="020B0604020202020204" pitchFamily="34" charset="0"/>
-              <a:buChar char="•"/>
-              <a:defRPr sz="1800" kern="1200">
-                <a:solidFill>
-                  <a:srgbClr val="000000"/>
-                </a:solidFill>
-                <a:latin typeface="Arial Narrow" panose="020B0606020202030204" pitchFamily="34" charset="0"/>
-                <a:ea typeface="+mn-ea"/>
-                <a:cs typeface="+mn-cs"/>
-                <a:sym typeface="Arial" panose="020B0604020202020204" pitchFamily="34" charset="0"/>
-              </a:defRPr>
-            </a:lvl2pPr>
-            <a:lvl3pPr marL="687388" indent="-241300" algn="l" rtl="0" eaLnBrk="0" fontAlgn="base" hangingPunct="0">
-              <a:spcBef>
-                <a:spcPts val="300"/>
-              </a:spcBef>
-              <a:spcAft>
-                <a:spcPct val="0"/>
-              </a:spcAft>
-              <a:buSzPct val="100000"/>
-              <a:buFont typeface="Arial" panose="020B0604020202020204" pitchFamily="34" charset="0"/>
-              <a:buChar char="•"/>
-              <a:defRPr sz="1800" kern="1200">
-                <a:solidFill>
-                  <a:srgbClr val="000000"/>
-                </a:solidFill>
-                <a:latin typeface="Arial Narrow" panose="020B0606020202030204" pitchFamily="34" charset="0"/>
-                <a:ea typeface="+mn-ea"/>
-                <a:cs typeface="+mn-cs"/>
-                <a:sym typeface="Arial" panose="020B0604020202020204" pitchFamily="34" charset="0"/>
-              </a:defRPr>
-            </a:lvl3pPr>
-            <a:lvl4pPr marL="955675" indent="-241300" algn="l" rtl="0" eaLnBrk="0" fontAlgn="base" hangingPunct="0">
-              <a:spcBef>
-                <a:spcPts val="300"/>
-              </a:spcBef>
-              <a:spcAft>
-                <a:spcPct val="0"/>
-              </a:spcAft>
-              <a:buSzPct val="100000"/>
-              <a:buFont typeface="Arial" panose="020B0604020202020204" pitchFamily="34" charset="0"/>
-              <a:buChar char="•"/>
-              <a:defRPr sz="1800" kern="1200">
-                <a:solidFill>
-                  <a:srgbClr val="000000"/>
-                </a:solidFill>
-                <a:latin typeface="Arial Narrow" panose="020B0606020202030204" pitchFamily="34" charset="0"/>
-                <a:ea typeface="+mn-ea"/>
-                <a:cs typeface="+mn-cs"/>
-                <a:sym typeface="Arial" panose="020B0604020202020204" pitchFamily="34" charset="0"/>
-              </a:defRPr>
-            </a:lvl4pPr>
-            <a:lvl5pPr marL="1227138" indent="-238125" algn="l" rtl="0" eaLnBrk="0" fontAlgn="base" hangingPunct="0">
-              <a:spcBef>
-                <a:spcPts val="300"/>
-              </a:spcBef>
-              <a:spcAft>
-                <a:spcPct val="0"/>
-              </a:spcAft>
-              <a:buSzPct val="100000"/>
-              <a:buFont typeface="Arial" panose="020B0604020202020204" pitchFamily="34" charset="0"/>
-              <a:buChar char="•"/>
-              <a:defRPr sz="1800" kern="1200">
-                <a:solidFill>
-                  <a:srgbClr val="000000"/>
-                </a:solidFill>
-                <a:latin typeface="Arial Narrow" panose="020B0606020202030204" pitchFamily="34" charset="0"/>
-                <a:ea typeface="+mn-ea"/>
-                <a:cs typeface="+mn-cs"/>
-                <a:sym typeface="Arial" panose="020B0604020202020204" pitchFamily="34" charset="0"/>
-              </a:defRPr>
-            </a:lvl5pPr>
-            <a:lvl6pPr marL="2514600" indent="-228600" algn="l" defTabSz="914400" rtl="0" eaLnBrk="1" latinLnBrk="0" hangingPunct="1">
-              <a:lnSpc>
-                <a:spcPct val="90000"/>
-              </a:lnSpc>
-              <a:spcBef>
-                <a:spcPts val="500"/>
-              </a:spcBef>
-              <a:buFont typeface="Arial" panose="020B0604020202020204" pitchFamily="34" charset="0"/>
-              <a:buChar char="•"/>
-              <a:defRPr sz="1800" kern="1200">
-                <a:solidFill>
-                  <a:schemeClr val="tx1"/>
-                </a:solidFill>
-                <a:latin typeface="+mn-lt"/>
-                <a:ea typeface="+mn-ea"/>
-                <a:cs typeface="+mn-cs"/>
-              </a:defRPr>
-            </a:lvl6pPr>
-            <a:lvl7pPr marL="2971800" indent="-228600" algn="l" defTabSz="914400" rtl="0" eaLnBrk="1" latinLnBrk="0" hangingPunct="1">
-              <a:lnSpc>
-                <a:spcPct val="90000"/>
-              </a:lnSpc>
-              <a:spcBef>
-                <a:spcPts val="500"/>
-              </a:spcBef>
-              <a:buFont typeface="Arial" panose="020B0604020202020204" pitchFamily="34" charset="0"/>
-              <a:buChar char="•"/>
-              <a:defRPr sz="1800" kern="1200">
-                <a:solidFill>
-                  <a:schemeClr val="tx1"/>
-                </a:solidFill>
-                <a:latin typeface="+mn-lt"/>
-                <a:ea typeface="+mn-ea"/>
-                <a:cs typeface="+mn-cs"/>
-              </a:defRPr>
-            </a:lvl7pPr>
-            <a:lvl8pPr marL="3429000" indent="-228600" algn="l" defTabSz="914400" rtl="0" eaLnBrk="1" latinLnBrk="0" hangingPunct="1">
-              <a:lnSpc>
-                <a:spcPct val="90000"/>
-              </a:lnSpc>
-              <a:spcBef>
-                <a:spcPts val="500"/>
-              </a:spcBef>
-              <a:buFont typeface="Arial" panose="020B0604020202020204" pitchFamily="34" charset="0"/>
-              <a:buChar char="•"/>
-              <a:defRPr sz="1800" kern="1200">
-                <a:solidFill>
-                  <a:schemeClr val="tx1"/>
-                </a:solidFill>
-                <a:latin typeface="+mn-lt"/>
-                <a:ea typeface="+mn-ea"/>
-                <a:cs typeface="+mn-cs"/>
-              </a:defRPr>
-            </a:lvl8pPr>
-            <a:lvl9pPr marL="3886200" indent="-228600" algn="l" defTabSz="914400" rtl="0" eaLnBrk="1" latinLnBrk="0" hangingPunct="1">
-              <a:lnSpc>
-                <a:spcPct val="90000"/>
-              </a:lnSpc>
-              <a:spcBef>
-                <a:spcPts val="500"/>
-              </a:spcBef>
-              <a:buFont typeface="Arial" panose="020B0604020202020204" pitchFamily="34" charset="0"/>
-              <a:buChar char="•"/>
-              <a:defRPr sz="1800" kern="1200">
-                <a:solidFill>
-                  <a:schemeClr val="tx1"/>
-                </a:solidFill>
-                <a:latin typeface="+mn-lt"/>
-                <a:ea typeface="+mn-ea"/>
-                <a:cs typeface="+mn-cs"/>
-              </a:defRPr>
-            </a:lvl9pPr>
-          </a:lstStyle>
-          <a:p>
-            <a:pPr marL="0" indent="0"/>
-            <a:r>
-              <a:rPr lang="de-DE" sz="1600" b="1" u="sng" dirty="0"/>
-              <a:t>Lehre und Beratung</a:t>
-            </a:r>
-          </a:p>
-          <a:p>
-            <a:pPr>
-              <a:buFont typeface="Arial" panose="020B0604020202020204" pitchFamily="34" charset="0"/>
-              <a:buChar char="•"/>
-            </a:pPr>
-            <a:r>
-              <a:rPr lang="de-DE" sz="1600" dirty="0"/>
-              <a:t>Vertiefungsseminare im FB 05 (Psychologie Bachelor)</a:t>
-            </a:r>
-          </a:p>
-          <a:p>
-            <a:pPr>
-              <a:buFont typeface="Arial" panose="020B0604020202020204" pitchFamily="34" charset="0"/>
-              <a:buChar char="•"/>
-            </a:pPr>
-            <a:r>
-              <a:rPr lang="de-DE" sz="1600" dirty="0"/>
-              <a:t>Quantitative Methodenberatung FB 02 bis FB 06</a:t>
-            </a:r>
+                <a:sym typeface="Wingdings" pitchFamily="2" charset="2"/>
+              </a:rPr>
+              <a:t>:)</a:t>
+            </a:r>
+            <a:endParaRPr lang="de-DE" sz="2000" dirty="0">
+              <a:solidFill>
+                <a:srgbClr val="000000"/>
+              </a:solidFill>
+              <a:latin typeface="+mn-lt"/>
+            </a:endParaRPr>
           </a:p>
         </p:txBody>
       </p:sp>

</xml_diff>

<commit_message>
update scripts: first notes
</commit_message>
<xml_diff>
--- a/Slides/Womeps_Day 1.pptx
+++ b/Slides/Womeps_Day 1.pptx
@@ -6008,12 +6008,8 @@
               <a:buChar char="•"/>
             </a:pPr>
             <a:r>
-              <a:rPr lang="de-DE" sz="2400"/>
-              <a:t>ggplot2 </a:t>
-            </a:r>
-            <a:r>
               <a:rPr lang="de-DE" sz="2400" dirty="0"/>
-              <a:t>effektiv bei Abschlussarbeiten einsetzen</a:t>
+              <a:t>ggplot2 effektiv bei Abschlussarbeiten einsetzen</a:t>
             </a:r>
           </a:p>
           <a:p>
@@ -6023,15 +6019,7 @@
             </a:pPr>
             <a:r>
               <a:rPr lang="de-DE" sz="2400" dirty="0"/>
-              <a:t>Aufzeigen welche Möglichkeiten </a:t>
-            </a:r>
-            <a:r>
-              <a:rPr lang="de-DE" sz="2400" dirty="0" err="1"/>
-              <a:t>ggplot</a:t>
-            </a:r>
-            <a:r>
-              <a:rPr lang="de-DE" sz="2400" dirty="0"/>
-              <a:t> mit sich bringt</a:t>
+              <a:t>Aufzeigen welche Möglichkeiten ggplot2 mit sich bringt</a:t>
             </a:r>
           </a:p>
           <a:p>

</xml_diff>